<commit_message>
edits for sections 1-4
</commit_message>
<xml_diff>
--- a/paper/v2/figures/compilation.pptx
+++ b/paper/v2/figures/compilation.pptx
@@ -249,7 +249,7 @@
           <a:p>
             <a:fld id="{D1C2FE12-02FD-40D2-9E73-08CF8D46514A}" type="datetimeFigureOut">
               <a:rPr lang="en-US" smtClean="0"/>
-              <a:t>1/28/16</a:t>
+              <a:t>6/19/16</a:t>
             </a:fld>
             <a:endParaRPr lang="en-US"/>
           </a:p>
@@ -419,7 +419,7 @@
           <a:p>
             <a:fld id="{D1C2FE12-02FD-40D2-9E73-08CF8D46514A}" type="datetimeFigureOut">
               <a:rPr lang="en-US" smtClean="0"/>
-              <a:t>1/28/16</a:t>
+              <a:t>6/19/16</a:t>
             </a:fld>
             <a:endParaRPr lang="en-US"/>
           </a:p>
@@ -599,7 +599,7 @@
           <a:p>
             <a:fld id="{D1C2FE12-02FD-40D2-9E73-08CF8D46514A}" type="datetimeFigureOut">
               <a:rPr lang="en-US" smtClean="0"/>
-              <a:t>1/28/16</a:t>
+              <a:t>6/19/16</a:t>
             </a:fld>
             <a:endParaRPr lang="en-US"/>
           </a:p>
@@ -769,7 +769,7 @@
           <a:p>
             <a:fld id="{D1C2FE12-02FD-40D2-9E73-08CF8D46514A}" type="datetimeFigureOut">
               <a:rPr lang="en-US" smtClean="0"/>
-              <a:t>1/28/16</a:t>
+              <a:t>6/19/16</a:t>
             </a:fld>
             <a:endParaRPr lang="en-US"/>
           </a:p>
@@ -1015,7 +1015,7 @@
           <a:p>
             <a:fld id="{D1C2FE12-02FD-40D2-9E73-08CF8D46514A}" type="datetimeFigureOut">
               <a:rPr lang="en-US" smtClean="0"/>
-              <a:t>1/28/16</a:t>
+              <a:t>6/19/16</a:t>
             </a:fld>
             <a:endParaRPr lang="en-US"/>
           </a:p>
@@ -1247,7 +1247,7 @@
           <a:p>
             <a:fld id="{D1C2FE12-02FD-40D2-9E73-08CF8D46514A}" type="datetimeFigureOut">
               <a:rPr lang="en-US" smtClean="0"/>
-              <a:t>1/28/16</a:t>
+              <a:t>6/19/16</a:t>
             </a:fld>
             <a:endParaRPr lang="en-US"/>
           </a:p>
@@ -1614,7 +1614,7 @@
           <a:p>
             <a:fld id="{D1C2FE12-02FD-40D2-9E73-08CF8D46514A}" type="datetimeFigureOut">
               <a:rPr lang="en-US" smtClean="0"/>
-              <a:t>1/28/16</a:t>
+              <a:t>6/19/16</a:t>
             </a:fld>
             <a:endParaRPr lang="en-US"/>
           </a:p>
@@ -1732,7 +1732,7 @@
           <a:p>
             <a:fld id="{D1C2FE12-02FD-40D2-9E73-08CF8D46514A}" type="datetimeFigureOut">
               <a:rPr lang="en-US" smtClean="0"/>
-              <a:t>1/28/16</a:t>
+              <a:t>6/19/16</a:t>
             </a:fld>
             <a:endParaRPr lang="en-US"/>
           </a:p>
@@ -1827,7 +1827,7 @@
           <a:p>
             <a:fld id="{D1C2FE12-02FD-40D2-9E73-08CF8D46514A}" type="datetimeFigureOut">
               <a:rPr lang="en-US" smtClean="0"/>
-              <a:t>1/28/16</a:t>
+              <a:t>6/19/16</a:t>
             </a:fld>
             <a:endParaRPr lang="en-US"/>
           </a:p>
@@ -2104,7 +2104,7 @@
           <a:p>
             <a:fld id="{D1C2FE12-02FD-40D2-9E73-08CF8D46514A}" type="datetimeFigureOut">
               <a:rPr lang="en-US" smtClean="0"/>
-              <a:t>1/28/16</a:t>
+              <a:t>6/19/16</a:t>
             </a:fld>
             <a:endParaRPr lang="en-US"/>
           </a:p>
@@ -2357,7 +2357,7 @@
           <a:p>
             <a:fld id="{D1C2FE12-02FD-40D2-9E73-08CF8D46514A}" type="datetimeFigureOut">
               <a:rPr lang="en-US" smtClean="0"/>
-              <a:t>1/28/16</a:t>
+              <a:t>6/19/16</a:t>
             </a:fld>
             <a:endParaRPr lang="en-US"/>
           </a:p>
@@ -2570,7 +2570,7 @@
           <a:p>
             <a:fld id="{D1C2FE12-02FD-40D2-9E73-08CF8D46514A}" type="datetimeFigureOut">
               <a:rPr lang="en-US" smtClean="0"/>
-              <a:t>1/28/16</a:t>
+              <a:t>6/19/16</a:t>
             </a:fld>
             <a:endParaRPr lang="en-US"/>
           </a:p>
@@ -5961,16 +5961,16 @@
       </p:grpSpPr>
       <p:grpSp>
         <p:nvGrpSpPr>
-          <p:cNvPr id="60" name="Group 59"/>
+          <p:cNvPr id="8" name="Group 7"/>
           <p:cNvGrpSpPr/>
           <p:nvPr/>
         </p:nvGrpSpPr>
         <p:grpSpPr>
           <a:xfrm>
             <a:off x="2125355" y="1140737"/>
-            <a:ext cx="3992216" cy="4578546"/>
+            <a:ext cx="4408620" cy="4578546"/>
             <a:chOff x="2125355" y="1140737"/>
-            <a:chExt cx="3992216" cy="4578546"/>
+            <a:chExt cx="4408620" cy="4578546"/>
           </a:xfrm>
         </p:grpSpPr>
         <p:grpSp>
@@ -6558,23 +6558,7 @@
                     <a:pPr algn="ctr"/>
                     <a:r>
                       <a:rPr lang="en-US" sz="1400" dirty="0" smtClean="0"/>
-                      <a:t>(A,</a:t>
-                    </a:r>
-                    <a:r>
-                      <a:rPr lang="en-US" sz="1400" dirty="0" smtClean="0"/>
-                      <a:t>–</a:t>
-                    </a:r>
-                    <a:r>
-                      <a:rPr lang="en-US" sz="1400" dirty="0" smtClean="0"/>
-                      <a:t>,</a:t>
-                    </a:r>
-                    <a:r>
-                      <a:rPr lang="en-US" sz="1400" dirty="0" smtClean="0"/>
-                      <a:t>2</a:t>
-                    </a:r>
-                    <a:r>
-                      <a:rPr lang="en-US" sz="1400" dirty="0" smtClean="0"/>
-                      <a:t>)</a:t>
+                      <a:t>(A,–,2)</a:t>
                     </a:r>
                     <a:endParaRPr lang="en-US" sz="1400" dirty="0"/>
                   </a:p>
@@ -6668,23 +6652,7 @@
                     <a:pPr algn="ctr"/>
                     <a:r>
                       <a:rPr lang="en-US" sz="1400" dirty="0" smtClean="0"/>
-                      <a:t>(B,</a:t>
-                    </a:r>
-                    <a:r>
-                      <a:rPr lang="en-US" sz="1400" dirty="0" smtClean="0"/>
-                      <a:t>–</a:t>
-                    </a:r>
-                    <a:r>
-                      <a:rPr lang="en-US" sz="1400" dirty="0" smtClean="0"/>
-                      <a:t>,</a:t>
-                    </a:r>
-                    <a:r>
-                      <a:rPr lang="en-US" sz="1400" dirty="0" smtClean="0"/>
-                      <a:t>2</a:t>
-                    </a:r>
-                    <a:r>
-                      <a:rPr lang="en-US" sz="1400" dirty="0" smtClean="0"/>
-                      <a:t>)</a:t>
+                      <a:t>(B,–,2)</a:t>
                     </a:r>
                     <a:endParaRPr lang="en-US" sz="1400" dirty="0"/>
                   </a:p>
@@ -6778,15 +6746,7 @@
                     <a:pPr algn="ctr"/>
                     <a:r>
                       <a:rPr lang="en-US" sz="1400" dirty="0" smtClean="0"/>
-                      <a:t>(E,</a:t>
-                    </a:r>
-                    <a:r>
-                      <a:rPr lang="en-US" sz="1400" dirty="0" smtClean="0"/>
-                      <a:t>–</a:t>
-                    </a:r>
-                    <a:r>
-                      <a:rPr lang="en-US" sz="1400" dirty="0" smtClean="0"/>
-                      <a:t>,2)</a:t>
+                      <a:t>(E,–,2)</a:t>
                     </a:r>
                     <a:endParaRPr lang="en-US" sz="1400" dirty="0"/>
                   </a:p>
@@ -7162,15 +7122,7 @@
                     <a:pPr algn="ctr"/>
                     <a:r>
                       <a:rPr lang="en-US" sz="1400" dirty="0" smtClean="0"/>
-                      <a:t>(D,</a:t>
-                    </a:r>
-                    <a:r>
-                      <a:rPr lang="en-US" sz="1400" dirty="0" smtClean="0"/>
-                      <a:t>–</a:t>
-                    </a:r>
-                    <a:r>
-                      <a:rPr lang="en-US" sz="1400" dirty="0" smtClean="0"/>
-                      <a:t>,2)</a:t>
+                      <a:t>(D,–,2)</a:t>
                     </a:r>
                     <a:endParaRPr lang="en-US" sz="1400" dirty="0"/>
                   </a:p>
@@ -7264,23 +7216,7 @@
                     <a:pPr algn="ctr"/>
                     <a:r>
                       <a:rPr lang="en-US" sz="1400" dirty="0" smtClean="0"/>
-                      <a:t>(B,</a:t>
-                    </a:r>
-                    <a:r>
-                      <a:rPr lang="en-US" sz="1400" dirty="0" smtClean="0"/>
-                      <a:t>–</a:t>
-                    </a:r>
-                    <a:r>
-                      <a:rPr lang="en-US" sz="1400" dirty="0" smtClean="0"/>
-                      <a:t>,</a:t>
-                    </a:r>
-                    <a:r>
-                      <a:rPr lang="en-US" sz="1400" dirty="0" smtClean="0"/>
-                      <a:t>3</a:t>
-                    </a:r>
-                    <a:r>
-                      <a:rPr lang="en-US" sz="1400" dirty="0" smtClean="0"/>
-                      <a:t>)</a:t>
+                      <a:t>(B,–,3)</a:t>
                     </a:r>
                     <a:endParaRPr lang="en-US" sz="1400" dirty="0"/>
                   </a:p>
@@ -7374,15 +7310,7 @@
                     <a:pPr algn="ctr"/>
                     <a:r>
                       <a:rPr lang="en-US" sz="1400" dirty="0" smtClean="0"/>
-                      <a:t>(C,</a:t>
-                    </a:r>
-                    <a:r>
-                      <a:rPr lang="en-US" sz="1400" dirty="0" smtClean="0"/>
-                      <a:t>–</a:t>
-                    </a:r>
-                    <a:r>
-                      <a:rPr lang="en-US" sz="1400" dirty="0" smtClean="0"/>
-                      <a:t>,2)</a:t>
+                      <a:t>(C,–,2)</a:t>
                     </a:r>
                     <a:endParaRPr lang="en-US" sz="1400" dirty="0"/>
                   </a:p>
@@ -7476,23 +7404,7 @@
                     <a:pPr algn="ctr"/>
                     <a:r>
                       <a:rPr lang="en-US" sz="1400" dirty="0" smtClean="0"/>
-                      <a:t>(W,</a:t>
-                    </a:r>
-                    <a:r>
-                      <a:rPr lang="en-US" sz="1400" dirty="0" smtClean="0"/>
-                      <a:t>–</a:t>
-                    </a:r>
-                    <a:r>
-                      <a:rPr lang="en-US" sz="1400" dirty="0" smtClean="0"/>
-                      <a:t>,</a:t>
-                    </a:r>
-                    <a:r>
-                      <a:rPr lang="en-US" sz="1400" dirty="0" smtClean="0"/>
-                      <a:t>4</a:t>
-                    </a:r>
-                    <a:r>
-                      <a:rPr lang="en-US" sz="1400" dirty="0" smtClean="0"/>
-                      <a:t>)</a:t>
+                      <a:t>(W,–,4)</a:t>
                     </a:r>
                     <a:endParaRPr lang="en-US" sz="1400" dirty="0"/>
                   </a:p>
@@ -7586,15 +7498,7 @@
                     <a:pPr algn="ctr"/>
                     <a:r>
                       <a:rPr lang="en-US" sz="1400" dirty="0" smtClean="0"/>
-                      <a:t>(W,5,</a:t>
-                    </a:r>
-                    <a:r>
-                      <a:rPr lang="en-US" sz="1400" dirty="0" smtClean="0"/>
-                      <a:t>–</a:t>
-                    </a:r>
-                    <a:r>
-                      <a:rPr lang="en-US" sz="1400" dirty="0" smtClean="0"/>
-                      <a:t>)</a:t>
+                      <a:t>(W,5,–)</a:t>
                     </a:r>
                     <a:endParaRPr lang="en-US" sz="1400" dirty="0"/>
                   </a:p>
@@ -7618,7 +7522,7 @@
                 <a:prstGeom prst="straightConnector1">
                   <a:avLst/>
                 </a:prstGeom>
-                <a:ln>
+                <a:ln w="12700">
                   <a:solidFill>
                     <a:schemeClr val="tx1"/>
                   </a:solidFill>
@@ -7657,7 +7561,7 @@
                 <a:prstGeom prst="straightConnector1">
                   <a:avLst/>
                 </a:prstGeom>
-                <a:ln>
+                <a:ln w="12700">
                   <a:solidFill>
                     <a:schemeClr val="tx1"/>
                   </a:solidFill>
@@ -7696,7 +7600,7 @@
                 <a:prstGeom prst="straightConnector1">
                   <a:avLst/>
                 </a:prstGeom>
-                <a:ln>
+                <a:ln w="12700">
                   <a:solidFill>
                     <a:schemeClr val="tx1"/>
                   </a:solidFill>
@@ -7735,7 +7639,7 @@
                 <a:prstGeom prst="straightConnector1">
                   <a:avLst/>
                 </a:prstGeom>
-                <a:ln>
+                <a:ln w="12700">
                   <a:solidFill>
                     <a:schemeClr val="tx1"/>
                   </a:solidFill>
@@ -7774,11 +7678,11 @@
                 <a:prstGeom prst="straightConnector1">
                   <a:avLst/>
                 </a:prstGeom>
-                <a:ln>
+                <a:ln w="12700">
                   <a:solidFill>
                     <a:schemeClr val="tx1"/>
                   </a:solidFill>
-                  <a:prstDash val="lgDash"/>
+                  <a:prstDash val="dash"/>
                   <a:tailEnd type="stealth"/>
                 </a:ln>
               </p:spPr>
@@ -7814,11 +7718,11 @@
                 <a:prstGeom prst="straightConnector1">
                   <a:avLst/>
                 </a:prstGeom>
-                <a:ln>
+                <a:ln w="12700">
                   <a:solidFill>
                     <a:schemeClr val="tx1"/>
                   </a:solidFill>
-                  <a:prstDash val="lgDash"/>
+                  <a:prstDash val="dash"/>
                   <a:tailEnd type="stealth"/>
                 </a:ln>
               </p:spPr>
@@ -7851,11 +7755,11 @@
                 <a:prstGeom prst="straightConnector1">
                   <a:avLst/>
                 </a:prstGeom>
-                <a:ln>
+                <a:ln w="12700">
                   <a:solidFill>
                     <a:schemeClr val="tx1"/>
                   </a:solidFill>
-                  <a:prstDash val="lgDash"/>
+                  <a:prstDash val="dash"/>
                   <a:tailEnd type="stealth"/>
                 </a:ln>
               </p:spPr>
@@ -7931,7 +7835,7 @@
                 <a:prstGeom prst="straightConnector1">
                   <a:avLst/>
                 </a:prstGeom>
-                <a:ln>
+                <a:ln w="12700">
                   <a:solidFill>
                     <a:schemeClr val="tx1"/>
                   </a:solidFill>
@@ -7970,7 +7874,7 @@
                 <a:prstGeom prst="straightConnector1">
                   <a:avLst/>
                 </a:prstGeom>
-                <a:ln>
+                <a:ln w="12700">
                   <a:solidFill>
                     <a:schemeClr val="tx1"/>
                   </a:solidFill>
@@ -8009,7 +7913,7 @@
                 <a:prstGeom prst="straightConnector1">
                   <a:avLst/>
                 </a:prstGeom>
-                <a:ln>
+                <a:ln w="12700">
                   <a:solidFill>
                     <a:schemeClr val="tx1"/>
                   </a:solidFill>
@@ -8048,7 +7952,7 @@
                 <a:prstGeom prst="straightConnector1">
                   <a:avLst/>
                 </a:prstGeom>
-                <a:ln>
+                <a:ln w="12700">
                   <a:solidFill>
                     <a:schemeClr val="tx1"/>
                   </a:solidFill>
@@ -8087,7 +7991,7 @@
                 <a:prstGeom prst="straightConnector1">
                   <a:avLst/>
                 </a:prstGeom>
-                <a:ln>
+                <a:ln w="12700">
                   <a:solidFill>
                     <a:schemeClr val="tx1"/>
                   </a:solidFill>
@@ -8126,7 +8030,7 @@
                 <a:prstGeom prst="straightConnector1">
                   <a:avLst/>
                 </a:prstGeom>
-                <a:ln>
+                <a:ln w="12700">
                   <a:solidFill>
                     <a:schemeClr val="tx1"/>
                   </a:solidFill>
@@ -8165,7 +8069,7 @@
                 <a:prstGeom prst="straightConnector1">
                   <a:avLst/>
                 </a:prstGeom>
-                <a:ln>
+                <a:ln w="12700">
                   <a:solidFill>
                     <a:schemeClr val="tx1"/>
                   </a:solidFill>
@@ -8204,11 +8108,11 @@
                 <a:prstGeom prst="straightConnector1">
                   <a:avLst/>
                 </a:prstGeom>
-                <a:ln>
+                <a:ln w="12700">
                   <a:solidFill>
                     <a:schemeClr val="tx1"/>
                   </a:solidFill>
-                  <a:prstDash val="lgDash"/>
+                  <a:prstDash val="dash"/>
                   <a:tailEnd type="stealth"/>
                 </a:ln>
               </p:spPr>
@@ -8244,11 +8148,11 @@
                 <a:prstGeom prst="straightConnector1">
                   <a:avLst/>
                 </a:prstGeom>
-                <a:ln>
+                <a:ln w="12700">
                   <a:solidFill>
                     <a:schemeClr val="tx1"/>
                   </a:solidFill>
-                  <a:prstDash val="lgDash"/>
+                  <a:prstDash val="dash"/>
                   <a:tailEnd type="stealth"/>
                 </a:ln>
               </p:spPr>
@@ -8281,11 +8185,11 @@
                 <a:prstGeom prst="straightConnector1">
                   <a:avLst/>
                 </a:prstGeom>
-                <a:ln>
+                <a:ln w="12700">
                   <a:solidFill>
                     <a:schemeClr val="tx1"/>
                   </a:solidFill>
-                  <a:prstDash val="lgDash"/>
+                  <a:prstDash val="dash"/>
                   <a:tailEnd type="stealth"/>
                 </a:ln>
               </p:spPr>
@@ -8318,7 +8222,7 @@
                 <a:prstGeom prst="straightConnector1">
                   <a:avLst/>
                 </a:prstGeom>
-                <a:ln>
+                <a:ln w="12700">
                   <a:solidFill>
                     <a:schemeClr val="tx1"/>
                   </a:solidFill>
@@ -8354,11 +8258,11 @@
                 <a:prstGeom prst="straightConnector1">
                   <a:avLst/>
                 </a:prstGeom>
-                <a:ln>
+                <a:ln w="12700">
                   <a:solidFill>
                     <a:schemeClr val="tx1"/>
                   </a:solidFill>
-                  <a:prstDash val="lgDash"/>
+                  <a:prstDash val="dash"/>
                   <a:tailEnd type="stealth"/>
                 </a:ln>
               </p:spPr>
@@ -8391,7 +8295,7 @@
                 <a:prstGeom prst="straightConnector1">
                   <a:avLst/>
                 </a:prstGeom>
-                <a:ln>
+                <a:ln w="12700">
                   <a:solidFill>
                     <a:schemeClr val="tx1"/>
                   </a:solidFill>
@@ -8427,11 +8331,11 @@
                 <a:prstGeom prst="straightConnector1">
                   <a:avLst/>
                 </a:prstGeom>
-                <a:ln>
+                <a:ln w="12700">
                   <a:solidFill>
                     <a:schemeClr val="tx1"/>
                   </a:solidFill>
-                  <a:prstDash val="lgDash"/>
+                  <a:prstDash val="dash"/>
                   <a:tailEnd type="stealth"/>
                 </a:ln>
               </p:spPr>
@@ -8464,11 +8368,11 @@
                 <a:prstGeom prst="straightConnector1">
                   <a:avLst/>
                 </a:prstGeom>
-                <a:ln>
+                <a:ln w="12700">
                   <a:solidFill>
                     <a:schemeClr val="tx1"/>
                   </a:solidFill>
-                  <a:prstDash val="lgDash"/>
+                  <a:prstDash val="dash"/>
                   <a:tailEnd type="stealth"/>
                 </a:ln>
               </p:spPr>
@@ -8501,11 +8405,11 @@
                 <a:prstGeom prst="straightConnector1">
                   <a:avLst/>
                 </a:prstGeom>
-                <a:ln>
+                <a:ln w="12700">
                   <a:solidFill>
                     <a:schemeClr val="tx1"/>
                   </a:solidFill>
-                  <a:prstDash val="lgDash"/>
+                  <a:prstDash val="dash"/>
                   <a:tailEnd type="stealth"/>
                 </a:ln>
               </p:spPr>
@@ -8541,7 +8445,7 @@
                 <a:prstGeom prst="straightConnector1">
                   <a:avLst/>
                 </a:prstGeom>
-                <a:ln>
+                <a:ln w="12700">
                   <a:solidFill>
                     <a:schemeClr val="tx1"/>
                   </a:solidFill>
@@ -8572,8 +8476,8 @@
             </p:nvSpPr>
             <p:spPr>
               <a:xfrm>
-                <a:off x="3661110" y="4994953"/>
-                <a:ext cx="934102" cy="338554"/>
+                <a:off x="3222461" y="5006485"/>
+                <a:ext cx="1360565" cy="338554"/>
               </a:xfrm>
               <a:prstGeom prst="rect">
                 <a:avLst/>
@@ -8588,12 +8492,20 @@
               <a:p>
                 <a:pPr algn="ctr"/>
                 <a:r>
-                  <a:rPr lang="en-US" sz="1600" dirty="0" err="1" smtClean="0"/>
-                  <a:t>Prefs</a:t>
+                  <a:rPr lang="en-US" sz="1600" dirty="0"/>
+                  <a:t>P(W, </a:t>
                 </a:r>
                 <a:r>
                   <a:rPr lang="en-US" sz="1600" dirty="0" smtClean="0"/>
-                  <a:t>: {2}</a:t>
+                  <a:t>–,4) </a:t>
+                </a:r>
+                <a:r>
+                  <a:rPr lang="en-US" sz="1600" b="1" dirty="0" smtClean="0"/>
+                  <a:t>=</a:t>
+                </a:r>
+                <a:r>
+                  <a:rPr lang="en-US" sz="1600" dirty="0" smtClean="0"/>
+                  <a:t> {2}</a:t>
                 </a:r>
                 <a:endParaRPr lang="en-US" sz="1600" dirty="0"/>
               </a:p>
@@ -8709,7 +8621,7 @@
               <a:prstGeom prst="straightConnector1">
                 <a:avLst/>
               </a:prstGeom>
-              <a:ln>
+              <a:ln w="12700">
                 <a:solidFill>
                   <a:schemeClr val="tx1"/>
                 </a:solidFill>
@@ -8745,7 +8657,7 @@
               <a:prstGeom prst="straightConnector1">
                 <a:avLst/>
               </a:prstGeom>
-              <a:ln>
+              <a:ln w="12700">
                 <a:solidFill>
                   <a:schemeClr val="tx1"/>
                 </a:solidFill>
@@ -8770,14 +8682,14 @@
         </p:grpSp>
         <p:sp>
           <p:nvSpPr>
-            <p:cNvPr id="100" name="TextBox 99"/>
+            <p:cNvPr id="85" name="TextBox 84"/>
             <p:cNvSpPr txBox="1"/>
             <p:nvPr/>
           </p:nvSpPr>
           <p:spPr>
             <a:xfrm>
-              <a:off x="5183469" y="4989754"/>
-              <a:ext cx="934102" cy="338554"/>
+              <a:off x="5178732" y="5010801"/>
+              <a:ext cx="1355243" cy="338554"/>
             </a:xfrm>
             <a:prstGeom prst="rect">
               <a:avLst/>
@@ -8792,12 +8704,20 @@
             <a:p>
               <a:pPr algn="ctr"/>
               <a:r>
-                <a:rPr lang="en-US" sz="1600" dirty="0" err="1" smtClean="0"/>
-                <a:t>Prefs</a:t>
+                <a:rPr lang="en-US" sz="1600" dirty="0"/>
+                <a:t>P(W, </a:t>
               </a:r>
               <a:r>
                 <a:rPr lang="en-US" sz="1600" dirty="0" smtClean="0"/>
-                <a:t>: {1}</a:t>
+                <a:t>5,–) </a:t>
+              </a:r>
+              <a:r>
+                <a:rPr lang="en-US" sz="1600" b="1" dirty="0" smtClean="0"/>
+                <a:t>= </a:t>
+              </a:r>
+              <a:r>
+                <a:rPr lang="en-US" sz="1600" dirty="0" smtClean="0"/>
+                <a:t>{1}</a:t>
               </a:r>
               <a:endParaRPr lang="en-US" sz="1600" dirty="0"/>
             </a:p>
@@ -8857,7 +8777,7 @@
         </p:blipFill>
         <p:spPr>
           <a:xfrm>
-            <a:off x="4089400" y="1136650"/>
+            <a:off x="3225800" y="920750"/>
             <a:ext cx="4013200" cy="4584700"/>
           </a:xfrm>
           <a:prstGeom prst="rect">

</xml_diff>